<commit_message>
presentation and extra models
</commit_message>
<xml_diff>
--- a/Presentation1.pptx
+++ b/Presentation1.pptx
@@ -3973,7 +3973,13 @@
     </dgm:pt>
     <dgm:pt modelId="{AD407359-B068-4346-A7F6-7040049EE503}">
       <dgm:prSet/>
-      <dgm:spPr/>
+      <dgm:spPr>
+        <a:ln w="28575">
+          <a:solidFill>
+            <a:srgbClr val="FC9A00"/>
+          </a:solidFill>
+        </a:ln>
+      </dgm:spPr>
       <dgm:t>
         <a:bodyPr/>
         <a:lstStyle/>
@@ -4009,7 +4015,13 @@
     </dgm:pt>
     <dgm:pt modelId="{2F101FCB-4663-475A-B843-1EADA7130B78}">
       <dgm:prSet/>
-      <dgm:spPr/>
+      <dgm:spPr>
+        <a:ln w="28575">
+          <a:solidFill>
+            <a:srgbClr val="FC9A00"/>
+          </a:solidFill>
+        </a:ln>
+      </dgm:spPr>
       <dgm:t>
         <a:bodyPr/>
         <a:lstStyle/>
@@ -4424,14 +4436,14 @@
       </dgm:t>
     </dgm:pt>
     <dgm:pt modelId="{81210471-819F-4721-A06D-8036D310FC76}">
-      <dgm:prSet/>
+      <dgm:prSet custT="1"/>
       <dgm:spPr/>
       <dgm:t>
         <a:bodyPr/>
         <a:lstStyle/>
         <a:p>
           <a:r>
-            <a:rPr lang="en-US"/>
+            <a:rPr lang="en-US" sz="1600"/>
             <a:t>Scrub current data from Amazon.com to run the models on the up-to-date dataset. </a:t>
           </a:r>
         </a:p>
@@ -4500,14 +4512,14 @@
       </dgm:t>
     </dgm:pt>
     <dgm:pt modelId="{796D4CA1-433F-4213-B843-53ACE3CE8F38}">
-      <dgm:prSet/>
+      <dgm:prSet custT="1"/>
       <dgm:spPr/>
       <dgm:t>
         <a:bodyPr/>
         <a:lstStyle/>
         <a:p>
           <a:r>
-            <a:rPr lang="en-US"/>
+            <a:rPr lang="en-US" sz="1600"/>
             <a:t>Further explore TensorFlow Recommenders to build advanced machine learning models. </a:t>
           </a:r>
         </a:p>
@@ -4576,14 +4588,14 @@
       </dgm:t>
     </dgm:pt>
     <dgm:pt modelId="{B1FB6D8F-FBD8-4E63-BE3F-B8D268385AF0}">
-      <dgm:prSet/>
+      <dgm:prSet custT="1"/>
       <dgm:spPr/>
       <dgm:t>
         <a:bodyPr/>
         <a:lstStyle/>
         <a:p>
           <a:r>
-            <a:rPr lang="en-US"/>
+            <a:rPr lang="en-US" sz="1600"/>
             <a:t>Incorporate time series data to fine tune Sequential models (RNN: Recurrent Neural Networks). </a:t>
           </a:r>
         </a:p>
@@ -4652,14 +4664,14 @@
       </dgm:t>
     </dgm:pt>
     <dgm:pt modelId="{1966AF6E-4347-408C-9725-ACBA2AAC8AA5}">
-      <dgm:prSet/>
+      <dgm:prSet custT="1"/>
       <dgm:spPr/>
       <dgm:t>
         <a:bodyPr/>
         <a:lstStyle/>
         <a:p>
           <a:r>
-            <a:rPr lang="en-US"/>
+            <a:rPr lang="en-US" sz="1600"/>
             <a:t>Run Convolutional Neural Networks (CNN) on image and video data. </a:t>
           </a:r>
         </a:p>
@@ -5493,14 +5505,9 @@
             <a:alphaOff val="0"/>
           </a:schemeClr>
         </a:solidFill>
-        <a:ln w="12700" cap="flat" cmpd="sng" algn="ctr">
+        <a:ln w="28575" cap="flat" cmpd="sng" algn="ctr">
           <a:solidFill>
-            <a:schemeClr val="accent1">
-              <a:hueOff val="0"/>
-              <a:satOff val="0"/>
-              <a:lumOff val="0"/>
-              <a:alphaOff val="0"/>
-            </a:schemeClr>
+            <a:srgbClr val="FC9A00"/>
           </a:solidFill>
           <a:prstDash val="solid"/>
           <a:miter lim="800000"/>
@@ -5621,14 +5628,9 @@
             <a:alphaOff val="0"/>
           </a:schemeClr>
         </a:solidFill>
-        <a:ln w="12700" cap="flat" cmpd="sng" algn="ctr">
+        <a:ln w="28575" cap="flat" cmpd="sng" algn="ctr">
           <a:solidFill>
-            <a:schemeClr val="accent1">
-              <a:hueOff val="0"/>
-              <a:satOff val="0"/>
-              <a:lumOff val="0"/>
-              <a:alphaOff val="0"/>
-            </a:schemeClr>
+            <a:srgbClr val="FC9A00"/>
           </a:solidFill>
           <a:prstDash val="solid"/>
           <a:miter lim="800000"/>
@@ -6045,12 +6047,12 @@
         <a:fontRef idx="minor"/>
       </dsp:style>
       <dsp:txBody>
-        <a:bodyPr spcFirstLastPara="0" vert="horz" wrap="square" lIns="81287" tIns="177800" rIns="81287" bIns="177800" numCol="1" spcCol="1270" anchor="ctr" anchorCtr="0">
+        <a:bodyPr spcFirstLastPara="0" vert="horz" wrap="square" lIns="81287" tIns="203200" rIns="81287" bIns="203200" numCol="1" spcCol="1270" anchor="ctr" anchorCtr="0">
           <a:noAutofit/>
         </a:bodyPr>
         <a:lstStyle/>
         <a:p>
-          <a:pPr marL="0" lvl="0" indent="0" algn="l" defTabSz="622300">
+          <a:pPr marL="0" lvl="0" indent="0" algn="l" defTabSz="711200">
             <a:lnSpc>
               <a:spcPct val="90000"/>
             </a:lnSpc>
@@ -6063,7 +6065,7 @@
             <a:buNone/>
           </a:pPr>
           <a:r>
-            <a:rPr lang="en-US" sz="1400" kern="1200"/>
+            <a:rPr lang="en-US" sz="1600" kern="1200"/>
             <a:t>Run Convolutional Neural Networks (CNN) on image and video data. </a:t>
           </a:r>
         </a:p>
@@ -6203,12 +6205,12 @@
         <a:fontRef idx="minor"/>
       </dsp:style>
       <dsp:txBody>
-        <a:bodyPr spcFirstLastPara="0" vert="horz" wrap="square" lIns="81287" tIns="177800" rIns="81287" bIns="177800" numCol="1" spcCol="1270" anchor="ctr" anchorCtr="0">
+        <a:bodyPr spcFirstLastPara="0" vert="horz" wrap="square" lIns="81287" tIns="203200" rIns="81287" bIns="203200" numCol="1" spcCol="1270" anchor="ctr" anchorCtr="0">
           <a:noAutofit/>
         </a:bodyPr>
         <a:lstStyle/>
         <a:p>
-          <a:pPr marL="0" lvl="0" indent="0" algn="l" defTabSz="622300">
+          <a:pPr marL="0" lvl="0" indent="0" algn="l" defTabSz="711200">
             <a:lnSpc>
               <a:spcPct val="90000"/>
             </a:lnSpc>
@@ -6221,7 +6223,7 @@
             <a:buNone/>
           </a:pPr>
           <a:r>
-            <a:rPr lang="en-US" sz="1400" kern="1200"/>
+            <a:rPr lang="en-US" sz="1600" kern="1200"/>
             <a:t>Incorporate time series data to fine tune Sequential models (RNN: Recurrent Neural Networks). </a:t>
           </a:r>
         </a:p>
@@ -6361,12 +6363,12 @@
         <a:fontRef idx="minor"/>
       </dsp:style>
       <dsp:txBody>
-        <a:bodyPr spcFirstLastPara="0" vert="horz" wrap="square" lIns="81287" tIns="177800" rIns="81287" bIns="177800" numCol="1" spcCol="1270" anchor="ctr" anchorCtr="0">
+        <a:bodyPr spcFirstLastPara="0" vert="horz" wrap="square" lIns="81287" tIns="203200" rIns="81287" bIns="203200" numCol="1" spcCol="1270" anchor="ctr" anchorCtr="0">
           <a:noAutofit/>
         </a:bodyPr>
         <a:lstStyle/>
         <a:p>
-          <a:pPr marL="0" lvl="0" indent="0" algn="l" defTabSz="622300">
+          <a:pPr marL="0" lvl="0" indent="0" algn="l" defTabSz="711200">
             <a:lnSpc>
               <a:spcPct val="90000"/>
             </a:lnSpc>
@@ -6379,7 +6381,7 @@
             <a:buNone/>
           </a:pPr>
           <a:r>
-            <a:rPr lang="en-US" sz="1400" kern="1200"/>
+            <a:rPr lang="en-US" sz="1600" kern="1200"/>
             <a:t>Further explore TensorFlow Recommenders to build advanced machine learning models. </a:t>
           </a:r>
         </a:p>
@@ -6519,12 +6521,12 @@
         <a:fontRef idx="minor"/>
       </dsp:style>
       <dsp:txBody>
-        <a:bodyPr spcFirstLastPara="0" vert="horz" wrap="square" lIns="81287" tIns="177800" rIns="81287" bIns="177800" numCol="1" spcCol="1270" anchor="ctr" anchorCtr="0">
+        <a:bodyPr spcFirstLastPara="0" vert="horz" wrap="square" lIns="81287" tIns="203200" rIns="81287" bIns="203200" numCol="1" spcCol="1270" anchor="ctr" anchorCtr="0">
           <a:noAutofit/>
         </a:bodyPr>
         <a:lstStyle/>
         <a:p>
-          <a:pPr marL="0" lvl="0" indent="0" algn="l" defTabSz="622300">
+          <a:pPr marL="0" lvl="0" indent="0" algn="l" defTabSz="711200">
             <a:lnSpc>
               <a:spcPct val="90000"/>
             </a:lnSpc>
@@ -6537,7 +6539,7 @@
             <a:buNone/>
           </a:pPr>
           <a:r>
-            <a:rPr lang="en-US" sz="1400" kern="1200"/>
+            <a:rPr lang="en-US" sz="1600" kern="1200"/>
             <a:t>Scrub current data from Amazon.com to run the models on the up-to-date dataset. </a:t>
           </a:r>
         </a:p>
@@ -12399,6 +12401,90 @@
           <a:bodyPr/>
           <a:lstStyle/>
           <a:p>
+            <a:endParaRPr lang="en-US" dirty="0"/>
+          </a:p>
+        </p:txBody>
+      </p:sp>
+      <p:sp>
+        <p:nvSpPr>
+          <p:cNvPr id="4" name="Slide Number Placeholder 3"/>
+          <p:cNvSpPr>
+            <a:spLocks noGrp="1"/>
+          </p:cNvSpPr>
+          <p:nvPr>
+            <p:ph type="sldNum" sz="quarter" idx="5"/>
+          </p:nvPr>
+        </p:nvSpPr>
+        <p:spPr/>
+        <p:txBody>
+          <a:bodyPr/>
+          <a:lstStyle/>
+          <a:p>
+            <a:fld id="{839DCFA9-BA34-EB4A-88FE-FC070F11FE97}" type="slidenum">
+              <a:rPr lang="en-US" smtClean="0"/>
+              <a:t>5</a:t>
+            </a:fld>
+            <a:endParaRPr lang="en-US"/>
+          </a:p>
+        </p:txBody>
+      </p:sp>
+    </p:spTree>
+    <p:extLst>
+      <p:ext uri="{BB962C8B-B14F-4D97-AF65-F5344CB8AC3E}">
+        <p14:creationId xmlns:p14="http://schemas.microsoft.com/office/powerpoint/2010/main" val="652750054"/>
+      </p:ext>
+    </p:extLst>
+  </p:cSld>
+  <p:clrMapOvr>
+    <a:masterClrMapping/>
+  </p:clrMapOvr>
+</p:notes>
+</file>
+
+<file path=ppt/notesSlides/notesSlide3.xml><?xml version="1.0" encoding="utf-8"?>
+<p:notes xmlns:a="http://schemas.openxmlformats.org/drawingml/2006/main" xmlns:r="http://schemas.openxmlformats.org/officeDocument/2006/relationships" xmlns:p="http://schemas.openxmlformats.org/presentationml/2006/main">
+  <p:cSld>
+    <p:spTree>
+      <p:nvGrpSpPr>
+        <p:cNvPr id="1" name=""/>
+        <p:cNvGrpSpPr/>
+        <p:nvPr/>
+      </p:nvGrpSpPr>
+      <p:grpSpPr>
+        <a:xfrm>
+          <a:off x="0" y="0"/>
+          <a:ext cx="0" cy="0"/>
+          <a:chOff x="0" y="0"/>
+          <a:chExt cx="0" cy="0"/>
+        </a:xfrm>
+      </p:grpSpPr>
+      <p:sp>
+        <p:nvSpPr>
+          <p:cNvPr id="2" name="Slide Image Placeholder 1"/>
+          <p:cNvSpPr>
+            <a:spLocks noGrp="1" noRot="1" noChangeAspect="1"/>
+          </p:cNvSpPr>
+          <p:nvPr>
+            <p:ph type="sldImg"/>
+          </p:nvPr>
+        </p:nvSpPr>
+        <p:spPr/>
+      </p:sp>
+      <p:sp>
+        <p:nvSpPr>
+          <p:cNvPr id="3" name="Notes Placeholder 2"/>
+          <p:cNvSpPr>
+            <a:spLocks noGrp="1"/>
+          </p:cNvSpPr>
+          <p:nvPr>
+            <p:ph type="body" idx="1"/>
+          </p:nvPr>
+        </p:nvSpPr>
+        <p:spPr/>
+        <p:txBody>
+          <a:bodyPr/>
+          <a:lstStyle/>
+          <a:p>
             <a:r>
               <a:rPr lang="en-US" dirty="0"/>
               <a:t>Add KDE</a:t>
@@ -12448,7 +12534,7 @@
 </p:notes>
 </file>
 
-<file path=ppt/notesSlides/notesSlide3.xml><?xml version="1.0" encoding="utf-8"?>
+<file path=ppt/notesSlides/notesSlide4.xml><?xml version="1.0" encoding="utf-8"?>
 <p:notes xmlns:a="http://schemas.openxmlformats.org/drawingml/2006/main" xmlns:r="http://schemas.openxmlformats.org/officeDocument/2006/relationships" xmlns:p="http://schemas.openxmlformats.org/presentationml/2006/main">
   <p:cSld>
     <p:spTree>
@@ -12535,7 +12621,7 @@
 </p:notes>
 </file>
 
-<file path=ppt/notesSlides/notesSlide4.xml><?xml version="1.0" encoding="utf-8"?>
+<file path=ppt/notesSlides/notesSlide5.xml><?xml version="1.0" encoding="utf-8"?>
 <p:notes xmlns:a="http://schemas.openxmlformats.org/drawingml/2006/main" xmlns:r="http://schemas.openxmlformats.org/officeDocument/2006/relationships" xmlns:p="http://schemas.openxmlformats.org/presentationml/2006/main">
   <p:cSld>
     <p:spTree>
@@ -12589,11 +12675,7 @@
             </a:r>
             <a:r>
               <a:rPr lang="en-US" dirty="0"/>
-              <a:t> </a:t>
-            </a:r>
-            <a:r>
-              <a:rPr lang="en-US"/>
-              <a:t>with visualizations</a:t>
+              <a:t> with visualizations</a:t>
             </a:r>
           </a:p>
         </p:txBody>
@@ -17995,7 +18077,7 @@
             <p:ph idx="1"/>
             <p:extLst>
               <p:ext uri="{D42A27DB-BD31-4B8C-83A1-F6EECF244321}">
-                <p14:modId xmlns:p14="http://schemas.microsoft.com/office/powerpoint/2010/main" val="929324253"/>
+                <p14:modId xmlns:p14="http://schemas.microsoft.com/office/powerpoint/2010/main" val="2785912941"/>
               </p:ext>
             </p:extLst>
           </p:nvPr>
@@ -18988,10 +19070,10 @@
       </p:grpSpPr>
       <p:sp useBgFill="1">
         <p:nvSpPr>
-          <p:cNvPr id="85" name="Rectangle 84">
+          <p:cNvPr id="128" name="Rectangle 118">
             <a:extLst>
               <a:ext uri="{FF2B5EF4-FFF2-40B4-BE49-F238E27FC236}">
-                <a16:creationId xmlns:a16="http://schemas.microsoft.com/office/drawing/2014/main" id="{158E38A4-F699-490C-8D1F-E8AD332D9B45}"/>
+                <a16:creationId xmlns:a16="http://schemas.microsoft.com/office/drawing/2014/main" id="{C07271E9-21F4-400B-84B6-052EAFCFE540}"/>
               </a:ext>
               <a:ext uri="{C183D7F6-B498-43B3-948B-1728B52AA6E4}">
                 <adec:decorative xmlns:adec="http://schemas.microsoft.com/office/drawing/2017/decorative" val="1"/>
@@ -19011,7 +19093,7 @@
         </p:nvSpPr>
         <p:spPr>
           <a:xfrm>
-            <a:off x="0" y="0"/>
+            <a:off x="-1" y="0"/>
             <a:ext cx="12192000" cy="6858000"/>
           </a:xfrm>
           <a:prstGeom prst="rect">
@@ -19023,6 +19105,19 @@
             <a:miter lim="800000"/>
           </a:ln>
           <a:effectLst/>
+          <a:extLst>
+            <a:ext uri="{91240B29-F687-4F45-9708-019B960494DF}">
+              <a14:hiddenLine xmlns:a14="http://schemas.microsoft.com/office/drawing/2010/main" w="12700" cap="flat" cmpd="sng" algn="ctr">
+                <a:solidFill>
+                  <a:schemeClr val="accent1">
+                    <a:shade val="50000"/>
+                  </a:schemeClr>
+                </a:solidFill>
+                <a:prstDash val="solid"/>
+                <a:miter lim="800000"/>
+              </a14:hiddenLine>
+            </a:ext>
+          </a:extLst>
         </p:spPr>
         <p:style>
           <a:lnRef idx="2">
@@ -19051,10 +19146,10 @@
       </p:sp>
       <p:sp>
         <p:nvSpPr>
-          <p:cNvPr id="87" name="Rectangle 86">
+          <p:cNvPr id="129" name="Rectangle 120">
             <a:extLst>
               <a:ext uri="{FF2B5EF4-FFF2-40B4-BE49-F238E27FC236}">
-                <a16:creationId xmlns:a16="http://schemas.microsoft.com/office/drawing/2014/main" id="{939C6AAB-48AC-41A3-95C2-6BF83715DF62}"/>
+                <a16:creationId xmlns:a16="http://schemas.microsoft.com/office/drawing/2014/main" id="{3E3D78ED-34B7-4F8E-8377-994DCAD3C852}"/>
               </a:ext>
               <a:ext uri="{C183D7F6-B498-43B3-948B-1728B52AA6E4}">
                 <adec:decorative xmlns:adec="http://schemas.microsoft.com/office/drawing/2017/decorative" val="1"/>
@@ -19075,7 +19170,7 @@
         <p:spPr>
           <a:xfrm>
             <a:off x="0" y="0"/>
-            <a:ext cx="7620000" cy="6858000"/>
+            <a:ext cx="12192000" cy="6869648"/>
           </a:xfrm>
           <a:prstGeom prst="rect">
             <a:avLst/>
@@ -19115,105 +19210,37 @@
           </a:p>
         </p:txBody>
       </p:sp>
-      <p:sp>
-        <p:nvSpPr>
-          <p:cNvPr id="89" name="Rectangle 88">
+      <p:pic>
+        <p:nvPicPr>
+          <p:cNvPr id="7" name="Picture 6" descr="Logo&#10;&#10;Description automatically generated">
             <a:extLst>
               <a:ext uri="{FF2B5EF4-FFF2-40B4-BE49-F238E27FC236}">
-                <a16:creationId xmlns:a16="http://schemas.microsoft.com/office/drawing/2014/main" id="{F6EE861B-7D2F-4B7C-A6E3-5937E81B8025}"/>
-              </a:ext>
-              <a:ext uri="{C183D7F6-B498-43B3-948B-1728B52AA6E4}">
-                <adec:decorative xmlns:adec="http://schemas.microsoft.com/office/drawing/2017/decorative" val="1"/>
+                <a16:creationId xmlns:a16="http://schemas.microsoft.com/office/drawing/2014/main" id="{D67642E8-F7AF-5CE0-B5BA-BDB7D9A2240A}"/>
               </a:ext>
             </a:extLst>
           </p:cNvPr>
-          <p:cNvSpPr>
-            <a:spLocks noGrp="1" noRot="1" noChangeAspect="1" noMove="1" noResize="1" noEditPoints="1" noAdjustHandles="1" noChangeArrowheads="1" noChangeShapeType="1" noTextEdit="1"/>
-          </p:cNvSpPr>
-          <p:nvPr>
-            <p:extLst>
-              <p:ext uri="{386F3935-93C4-4BCD-93E2-E3B085C9AB24}">
-                <p16:designElem xmlns:p16="http://schemas.microsoft.com/office/powerpoint/2015/main" val="1"/>
-              </p:ext>
-            </p:extLst>
-          </p:nvPr>
-        </p:nvSpPr>
+          <p:cNvPicPr>
+            <a:picLocks noChangeAspect="1"/>
+          </p:cNvPicPr>
+          <p:nvPr/>
+        </p:nvPicPr>
+        <p:blipFill rotWithShape="1">
+          <a:blip r:embed="rId3">
+            <a:alphaModFix/>
+          </a:blip>
+          <a:srcRect r="170" b="1"/>
+          <a:stretch/>
+        </p:blipFill>
         <p:spPr>
           <a:xfrm>
-            <a:off x="153081" y="159026"/>
-            <a:ext cx="7313839" cy="6542788"/>
+            <a:off x="20" y="10"/>
+            <a:ext cx="12191979" cy="6869638"/>
           </a:xfrm>
           <a:prstGeom prst="rect">
             <a:avLst/>
           </a:prstGeom>
-          <a:solidFill>
-            <a:schemeClr val="bg1"/>
-          </a:solidFill>
-          <a:ln>
-            <a:noFill/>
-          </a:ln>
         </p:spPr>
-        <p:style>
-          <a:lnRef idx="2">
-            <a:schemeClr val="accent1">
-              <a:shade val="50000"/>
-            </a:schemeClr>
-          </a:lnRef>
-          <a:fillRef idx="1">
-            <a:schemeClr val="accent1"/>
-          </a:fillRef>
-          <a:effectRef idx="0">
-            <a:schemeClr val="accent1"/>
-          </a:effectRef>
-          <a:fontRef idx="minor">
-            <a:schemeClr val="lt1"/>
-          </a:fontRef>
-        </p:style>
-        <p:txBody>
-          <a:bodyPr rtlCol="0" anchor="ctr"/>
-          <a:lstStyle/>
-          <a:p>
-            <a:pPr algn="ctr"/>
-            <a:endParaRPr lang="en-US"/>
-          </a:p>
-        </p:txBody>
-      </p:sp>
-      <p:sp>
-        <p:nvSpPr>
-          <p:cNvPr id="2" name="Title 1">
-            <a:extLst>
-              <a:ext uri="{FF2B5EF4-FFF2-40B4-BE49-F238E27FC236}">
-                <a16:creationId xmlns:a16="http://schemas.microsoft.com/office/drawing/2014/main" id="{E4836ED0-EFA2-6CD9-F690-536FF6AE6408}"/>
-              </a:ext>
-            </a:extLst>
-          </p:cNvPr>
-          <p:cNvSpPr>
-            <a:spLocks noGrp="1"/>
-          </p:cNvSpPr>
-          <p:nvPr>
-            <p:ph type="title"/>
-          </p:nvPr>
-        </p:nvSpPr>
-        <p:spPr>
-          <a:xfrm>
-            <a:off x="1077426" y="723901"/>
-            <a:ext cx="5465148" cy="1288884"/>
-          </a:xfrm>
-        </p:spPr>
-        <p:txBody>
-          <a:bodyPr anchor="b">
-            <a:normAutofit/>
-          </a:bodyPr>
-          <a:lstStyle/>
-          <a:p>
-            <a:pPr algn="ctr"/>
-            <a:r>
-              <a:rPr lang="en-US"/>
-              <a:t>Summary</a:t>
-            </a:r>
-          </a:p>
-        </p:txBody>
-      </p:sp>
+      </p:pic>
       <p:sp>
         <p:nvSpPr>
           <p:cNvPr id="25" name="Content Placeholder 2">
@@ -19232,123 +19259,118 @@
         </p:nvSpPr>
         <p:spPr>
           <a:xfrm>
-            <a:off x="1077426" y="2732545"/>
-            <a:ext cx="5465149" cy="3232826"/>
+            <a:off x="1008993" y="4600668"/>
+            <a:ext cx="6788076" cy="3416512"/>
           </a:xfrm>
+          <a:effectLst>
+            <a:outerShdw blurRad="50800" dist="12700" dir="2700000" algn="tl" rotWithShape="0">
+              <a:prstClr val="black">
+                <a:alpha val="40000"/>
+              </a:prstClr>
+            </a:outerShdw>
+          </a:effectLst>
         </p:spPr>
         <p:txBody>
-          <a:bodyPr anchor="t">
+          <a:bodyPr>
             <a:normAutofit/>
           </a:bodyPr>
           <a:lstStyle/>
           <a:p>
-            <a:pPr algn="ctr"/>
             <a:r>
-              <a:rPr lang="en-US" dirty="0"/>
-              <a:t>Objective: </a:t>
+              <a:rPr lang="en-US" sz="1800" dirty="0">
+                <a:solidFill>
+                  <a:schemeClr val="bg1"/>
+                </a:solidFill>
+              </a:rPr>
+              <a:t>OBJECTIVE:  Explore Neural Networks by using TensorFlow Recommenders to address Cold Start problem. </a:t>
             </a:r>
           </a:p>
           <a:p>
-            <a:pPr algn="ctr"/>
             <a:r>
-              <a:rPr lang="en-US" dirty="0"/>
-              <a:t>Explore Neural Networks by using TensorFlow Recommenders to address Cold Start problem. </a:t>
+              <a:rPr lang="en-US" sz="1800" dirty="0">
+                <a:solidFill>
+                  <a:schemeClr val="bg1"/>
+                </a:solidFill>
+              </a:rPr>
+              <a:t>PROJECTED OUTCOME:</a:t>
             </a:r>
           </a:p>
           <a:p>
-            <a:pPr algn="ctr"/>
-            <a:endParaRPr lang="en-US" dirty="0"/>
-          </a:p>
-          <a:p>
-            <a:pPr algn="ctr"/>
             <a:r>
-              <a:rPr lang="en-US" dirty="0"/>
-              <a:t>Projected Outcome: </a:t>
-            </a:r>
-          </a:p>
-          <a:p>
-            <a:pPr marL="342900" indent="-342900" algn="ctr">
-              <a:buFontTx/>
-              <a:buChar char="-"/>
-            </a:pPr>
-            <a:r>
-              <a:rPr lang="en-US" dirty="0"/>
+              <a:rPr lang="en-US" sz="1800" dirty="0">
+                <a:solidFill>
+                  <a:schemeClr val="bg1"/>
+                </a:solidFill>
+              </a:rPr>
               <a:t>Test Retrieval, Ranking, and Sequential models </a:t>
             </a:r>
           </a:p>
           <a:p>
-            <a:pPr marL="342900" indent="-342900" algn="ctr">
-              <a:buFontTx/>
-              <a:buChar char="-"/>
-            </a:pPr>
             <a:r>
-              <a:rPr lang="en-US" dirty="0"/>
+              <a:rPr lang="en-US" sz="1800" dirty="0">
+                <a:solidFill>
+                  <a:schemeClr val="bg1"/>
+                </a:solidFill>
+              </a:rPr>
               <a:t>Test efficient serving (</a:t>
             </a:r>
             <a:r>
-              <a:rPr lang="en-US" dirty="0" err="1"/>
+              <a:rPr lang="en-US" sz="1800" dirty="0" err="1">
+                <a:solidFill>
+                  <a:schemeClr val="bg1"/>
+                </a:solidFill>
+              </a:rPr>
               <a:t>ScaNN</a:t>
             </a:r>
             <a:r>
-              <a:rPr lang="en-US" dirty="0"/>
+              <a:rPr lang="en-US" sz="1800" dirty="0">
+                <a:solidFill>
+                  <a:schemeClr val="bg1"/>
+                </a:solidFill>
+              </a:rPr>
               <a:t>) </a:t>
             </a:r>
           </a:p>
           <a:p>
             <a:pPr algn="ctr"/>
-            <a:endParaRPr lang="en-US" dirty="0"/>
+            <a:endParaRPr lang="en-US" dirty="0">
+              <a:solidFill>
+                <a:schemeClr val="tx1"/>
+              </a:solidFill>
+            </a:endParaRPr>
           </a:p>
           <a:p>
             <a:pPr algn="ctr"/>
-            <a:endParaRPr lang="en-US" dirty="0"/>
+            <a:endParaRPr lang="en-US" dirty="0">
+              <a:solidFill>
+                <a:schemeClr val="tx1"/>
+              </a:solidFill>
+            </a:endParaRPr>
           </a:p>
           <a:p>
             <a:pPr algn="ctr"/>
-            <a:endParaRPr lang="en-US" dirty="0"/>
+            <a:endParaRPr lang="en-US" dirty="0">
+              <a:solidFill>
+                <a:schemeClr val="tx1"/>
+              </a:solidFill>
+            </a:endParaRPr>
           </a:p>
           <a:p>
             <a:pPr algn="ctr"/>
-            <a:endParaRPr lang="en-US" dirty="0"/>
+            <a:endParaRPr lang="en-US" dirty="0">
+              <a:solidFill>
+                <a:schemeClr val="tx1"/>
+              </a:solidFill>
+            </a:endParaRPr>
           </a:p>
         </p:txBody>
       </p:sp>
-      <p:pic>
-        <p:nvPicPr>
-          <p:cNvPr id="80" name="Picture 62" descr="Light bulb on yellow background with sketched light beams and cord">
+      <p:grpSp>
+        <p:nvGrpSpPr>
+          <p:cNvPr id="130" name="Group 122">
             <a:extLst>
               <a:ext uri="{FF2B5EF4-FFF2-40B4-BE49-F238E27FC236}">
-                <a16:creationId xmlns:a16="http://schemas.microsoft.com/office/drawing/2014/main" id="{F9662D3B-3E5E-F3A9-7D01-764FD78C8D6C}"/>
-              </a:ext>
-            </a:extLst>
-          </p:cNvPr>
-          <p:cNvPicPr>
-            <a:picLocks noChangeAspect="1"/>
-          </p:cNvPicPr>
-          <p:nvPr/>
-        </p:nvPicPr>
-        <p:blipFill rotWithShape="1">
-          <a:blip r:embed="rId3">
-            <a:alphaModFix/>
-          </a:blip>
-          <a:srcRect l="51760" r="7240"/>
-          <a:stretch/>
-        </p:blipFill>
-        <p:spPr>
-          <a:xfrm>
-            <a:off x="7620000" y="10"/>
-            <a:ext cx="4572000" cy="6857990"/>
-          </a:xfrm>
-          <a:prstGeom prst="rect">
-            <a:avLst/>
-          </a:prstGeom>
-        </p:spPr>
-      </p:pic>
-      <p:grpSp>
-        <p:nvGrpSpPr>
-          <p:cNvPr id="91" name="Group 90">
-            <a:extLst>
-              <a:ext uri="{FF2B5EF4-FFF2-40B4-BE49-F238E27FC236}">
-                <a16:creationId xmlns:a16="http://schemas.microsoft.com/office/drawing/2014/main" id="{073091F1-AA5A-47C6-9502-D5870A72D50C}"/>
+                <a16:creationId xmlns:a16="http://schemas.microsoft.com/office/drawing/2014/main" id="{A1527245-C5C2-4BD3-8317-C4D6D7A10213}"/>
               </a:ext>
               <a:ext uri="{C183D7F6-B498-43B3-948B-1728B52AA6E4}">
                 <adec:decorative xmlns:adec="http://schemas.microsoft.com/office/drawing/2017/decorative" val="1"/>
@@ -19368,7 +19390,7 @@
         </p:nvGrpSpPr>
         <p:grpSpPr>
           <a:xfrm>
-            <a:off x="3376258" y="2320171"/>
+            <a:off x="5662258" y="5849932"/>
             <a:ext cx="867485" cy="115439"/>
             <a:chOff x="8910933" y="1861308"/>
             <a:chExt cx="867485" cy="115439"/>
@@ -19376,10 +19398,10 @@
         </p:grpSpPr>
         <p:sp>
           <p:nvSpPr>
-            <p:cNvPr id="92" name="Rectangle 91">
+            <p:cNvPr id="131" name="Rectangle 123">
               <a:extLst>
                 <a:ext uri="{FF2B5EF4-FFF2-40B4-BE49-F238E27FC236}">
-                  <a16:creationId xmlns:a16="http://schemas.microsoft.com/office/drawing/2014/main" id="{8085C4F7-6E91-4DF6-BB01-A46132BC3587}"/>
+                  <a16:creationId xmlns:a16="http://schemas.microsoft.com/office/drawing/2014/main" id="{E03BA463-C04F-4127-9100-1F376E519B76}"/>
                 </a:ext>
                 <a:ext uri="{C183D7F6-B498-43B3-948B-1728B52AA6E4}">
                   <adec:decorative xmlns:adec="http://schemas.microsoft.com/office/drawing/2017/decorative" val="1"/>
@@ -19406,7 +19428,7 @@
             <a:noFill/>
             <a:ln w="15875">
               <a:solidFill>
-                <a:schemeClr val="tx2"/>
+                <a:schemeClr val="tx1"/>
               </a:solidFill>
             </a:ln>
           </p:spPr>
@@ -19433,7 +19455,7 @@
               <a:pPr algn="ctr"/>
               <a:endParaRPr lang="en-US">
                 <a:solidFill>
-                  <a:schemeClr val="bg1"/>
+                  <a:srgbClr val="FFFFFF"/>
                 </a:solidFill>
                 <a:effectLst>
                   <a:outerShdw blurRad="38100" dist="38100" dir="2700000" algn="tl">
@@ -19448,10 +19470,10 @@
         </p:sp>
         <p:cxnSp>
           <p:nvCxnSpPr>
-            <p:cNvPr id="93" name="Straight Connector 92">
+            <p:cNvPr id="125" name="Straight Connector 124">
               <a:extLst>
                 <a:ext uri="{FF2B5EF4-FFF2-40B4-BE49-F238E27FC236}">
-                  <a16:creationId xmlns:a16="http://schemas.microsoft.com/office/drawing/2014/main" id="{25476588-B9AD-4662-A085-8E4D91493B3F}"/>
+                  <a16:creationId xmlns:a16="http://schemas.microsoft.com/office/drawing/2014/main" id="{01FD6DA6-F7BC-4426-8465-928C4EC4A4C3}"/>
                 </a:ext>
                 <a:ext uri="{C183D7F6-B498-43B3-948B-1728B52AA6E4}">
                   <adec:decorative xmlns:adec="http://schemas.microsoft.com/office/drawing/2017/decorative" val="1"/>
@@ -19477,7 +19499,7 @@
             </a:prstGeom>
             <a:ln w="15875">
               <a:solidFill>
-                <a:schemeClr val="tx2"/>
+                <a:schemeClr val="tx1"/>
               </a:solidFill>
             </a:ln>
           </p:spPr>
@@ -19498,10 +19520,10 @@
         </p:cxnSp>
         <p:cxnSp>
           <p:nvCxnSpPr>
-            <p:cNvPr id="94" name="Straight Connector 93">
+            <p:cNvPr id="126" name="Straight Connector 125">
               <a:extLst>
                 <a:ext uri="{FF2B5EF4-FFF2-40B4-BE49-F238E27FC236}">
-                  <a16:creationId xmlns:a16="http://schemas.microsoft.com/office/drawing/2014/main" id="{BCDB34B3-D348-476E-BE7F-1139370F4310}"/>
+                  <a16:creationId xmlns:a16="http://schemas.microsoft.com/office/drawing/2014/main" id="{49A28AE3-3C29-44E4-80A5-C2937F8E7AAF}"/>
                 </a:ext>
                 <a:ext uri="{C183D7F6-B498-43B3-948B-1728B52AA6E4}">
                   <adec:decorative xmlns:adec="http://schemas.microsoft.com/office/drawing/2017/decorative" val="1"/>
@@ -19527,7 +19549,7 @@
             </a:prstGeom>
             <a:ln w="15875">
               <a:solidFill>
-                <a:schemeClr val="tx2"/>
+                <a:schemeClr val="tx1"/>
               </a:solidFill>
             </a:ln>
           </p:spPr>
@@ -19555,7 +19577,7 @@
     </p:extLst>
   </p:cSld>
   <p:clrMapOvr>
-    <a:masterClrMapping/>
+    <a:overrideClrMapping bg1="dk1" tx1="lt1" bg2="dk2" tx2="lt2" accent1="accent1" accent2="accent2" accent3="accent3" accent4="accent4" accent5="accent5" accent6="accent6" hlink="hlink" folHlink="folHlink"/>
   </p:clrMapOvr>
 </p:sld>
 </file>
@@ -20123,7 +20145,7 @@
             <p:ph idx="1"/>
             <p:extLst>
               <p:ext uri="{D42A27DB-BD31-4B8C-83A1-F6EECF244321}">
-                <p14:modId xmlns:p14="http://schemas.microsoft.com/office/powerpoint/2010/main" val="1634581999"/>
+                <p14:modId xmlns:p14="http://schemas.microsoft.com/office/powerpoint/2010/main" val="1815867661"/>
               </p:ext>
             </p:extLst>
           </p:nvPr>
@@ -20482,18 +20504,7 @@
             </a:pPr>
             <a:r>
               <a:rPr lang="en-US" sz="1400" dirty="0"/>
-              <a:t>2.3M data entries of Outdoor product reviews </a:t>
-            </a:r>
-          </a:p>
-          <a:p>
-            <a:pPr algn="ctr">
-              <a:lnSpc>
-                <a:spcPct val="100000"/>
-              </a:lnSpc>
-            </a:pPr>
-            <a:r>
-              <a:rPr lang="en-US" sz="1400" dirty="0"/>
-              <a:t>(2000 – 2015)</a:t>
+              <a:t>2.3M Outdoor product reviews (2000 – 2015)</a:t>
             </a:r>
           </a:p>
           <a:p>
@@ -20537,7 +20548,7 @@
             </a:pPr>
             <a:r>
               <a:rPr lang="en-US" sz="1400" dirty="0">
-                <a:hlinkClick r:id="rId2"/>
+                <a:hlinkClick r:id="rId3"/>
               </a:rPr>
               <a:t>Amazon Reviews dataset</a:t>
             </a:r>
@@ -20608,37 +20619,6 @@
           </a:p>
         </p:txBody>
       </p:sp>
-      <p:pic>
-        <p:nvPicPr>
-          <p:cNvPr id="29" name="Picture 4" descr="Computer script on a screen">
-            <a:extLst>
-              <a:ext uri="{FF2B5EF4-FFF2-40B4-BE49-F238E27FC236}">
-                <a16:creationId xmlns:a16="http://schemas.microsoft.com/office/drawing/2014/main" id="{FF901000-4B60-9B8C-C442-8B1073646BE3}"/>
-              </a:ext>
-            </a:extLst>
-          </p:cNvPr>
-          <p:cNvPicPr>
-            <a:picLocks noChangeAspect="1"/>
-          </p:cNvPicPr>
-          <p:nvPr/>
-        </p:nvPicPr>
-        <p:blipFill rotWithShape="1">
-          <a:blip r:embed="rId3">
-            <a:alphaModFix/>
-          </a:blip>
-          <a:srcRect l="245" r="40421" b="-1"/>
-          <a:stretch/>
-        </p:blipFill>
-        <p:spPr>
-          <a:xfrm>
-            <a:off x="1682" y="10"/>
-            <a:ext cx="6096000" cy="6857990"/>
-          </a:xfrm>
-          <a:prstGeom prst="rect">
-            <a:avLst/>
-          </a:prstGeom>
-        </p:spPr>
-      </p:pic>
       <p:grpSp>
         <p:nvGrpSpPr>
           <p:cNvPr id="63" name="Group 54">
@@ -20843,6 +20823,36 @@
           </p:style>
         </p:cxnSp>
       </p:grpSp>
+      <p:pic>
+        <p:nvPicPr>
+          <p:cNvPr id="10" name="Picture 9" descr="Graphical user interface, diagram&#10;&#10;Description automatically generated">
+            <a:extLst>
+              <a:ext uri="{FF2B5EF4-FFF2-40B4-BE49-F238E27FC236}">
+                <a16:creationId xmlns:a16="http://schemas.microsoft.com/office/drawing/2014/main" id="{E610C3C6-6DCA-6945-5EE9-4A4E079FD2BC}"/>
+              </a:ext>
+            </a:extLst>
+          </p:cNvPr>
+          <p:cNvPicPr>
+            <a:picLocks noChangeAspect="1"/>
+          </p:cNvPicPr>
+          <p:nvPr/>
+        </p:nvPicPr>
+        <p:blipFill>
+          <a:blip r:embed="rId4"/>
+          <a:stretch>
+            <a:fillRect/>
+          </a:stretch>
+        </p:blipFill>
+        <p:spPr>
+          <a:xfrm>
+            <a:off x="152400" y="164574"/>
+            <a:ext cx="5786315" cy="6248583"/>
+          </a:xfrm>
+          <a:prstGeom prst="rect">
+            <a:avLst/>
+          </a:prstGeom>
+        </p:spPr>
+      </p:pic>
     </p:spTree>
     <p:extLst>
       <p:ext uri="{BB962C8B-B14F-4D97-AF65-F5344CB8AC3E}">
@@ -21144,6 +21154,58 @@
           </a:p>
         </p:txBody>
       </p:sp>
+      <p:sp>
+        <p:nvSpPr>
+          <p:cNvPr id="7" name="Rectangle 6">
+            <a:extLst>
+              <a:ext uri="{FF2B5EF4-FFF2-40B4-BE49-F238E27FC236}">
+                <a16:creationId xmlns:a16="http://schemas.microsoft.com/office/drawing/2014/main" id="{36F863FB-C75E-362B-7853-6501C472922F}"/>
+              </a:ext>
+            </a:extLst>
+          </p:cNvPr>
+          <p:cNvSpPr/>
+          <p:nvPr/>
+        </p:nvSpPr>
+        <p:spPr>
+          <a:xfrm>
+            <a:off x="4139514" y="1334530"/>
+            <a:ext cx="2187145" cy="4732638"/>
+          </a:xfrm>
+          <a:prstGeom prst="rect">
+            <a:avLst/>
+          </a:prstGeom>
+          <a:noFill/>
+          <a:ln w="28575">
+            <a:solidFill>
+              <a:srgbClr val="FF0000"/>
+            </a:solidFill>
+          </a:ln>
+        </p:spPr>
+        <p:style>
+          <a:lnRef idx="2">
+            <a:schemeClr val="accent1">
+              <a:shade val="50000"/>
+            </a:schemeClr>
+          </a:lnRef>
+          <a:fillRef idx="1">
+            <a:schemeClr val="accent1"/>
+          </a:fillRef>
+          <a:effectRef idx="0">
+            <a:schemeClr val="accent1"/>
+          </a:effectRef>
+          <a:fontRef idx="minor">
+            <a:schemeClr val="lt1"/>
+          </a:fontRef>
+        </p:style>
+        <p:txBody>
+          <a:bodyPr rtlCol="0" anchor="ctr"/>
+          <a:lstStyle/>
+          <a:p>
+            <a:pPr algn="ctr"/>
+            <a:endParaRPr lang="en-US"/>
+          </a:p>
+        </p:txBody>
+      </p:sp>
     </p:spTree>
     <p:extLst>
       <p:ext uri="{BB962C8B-B14F-4D97-AF65-F5344CB8AC3E}">
@@ -21263,6 +21325,58 @@
           </a:p>
         </p:txBody>
       </p:sp>
+      <p:sp>
+        <p:nvSpPr>
+          <p:cNvPr id="12" name="Arc 11">
+            <a:extLst>
+              <a:ext uri="{FF2B5EF4-FFF2-40B4-BE49-F238E27FC236}">
+                <a16:creationId xmlns:a16="http://schemas.microsoft.com/office/drawing/2014/main" id="{5843C859-84B2-C409-BAC9-C197EAE34A55}"/>
+              </a:ext>
+            </a:extLst>
+          </p:cNvPr>
+          <p:cNvSpPr/>
+          <p:nvPr/>
+        </p:nvSpPr>
+        <p:spPr>
+          <a:xfrm rot="6598986">
+            <a:off x="5663001" y="1075472"/>
+            <a:ext cx="7262105" cy="2212572"/>
+          </a:xfrm>
+          <a:prstGeom prst="arc">
+            <a:avLst>
+              <a:gd name="adj1" fmla="val 13961724"/>
+              <a:gd name="adj2" fmla="val 21373434"/>
+            </a:avLst>
+          </a:prstGeom>
+          <a:ln w="28575">
+            <a:solidFill>
+              <a:srgbClr val="FF0000"/>
+            </a:solidFill>
+          </a:ln>
+        </p:spPr>
+        <p:style>
+          <a:lnRef idx="1">
+            <a:schemeClr val="accent1"/>
+          </a:lnRef>
+          <a:fillRef idx="0">
+            <a:schemeClr val="accent1"/>
+          </a:fillRef>
+          <a:effectRef idx="0">
+            <a:schemeClr val="accent1"/>
+          </a:effectRef>
+          <a:fontRef idx="minor">
+            <a:schemeClr val="tx1"/>
+          </a:fontRef>
+        </p:style>
+        <p:txBody>
+          <a:bodyPr rtlCol="0" anchor="ctr"/>
+          <a:lstStyle/>
+          <a:p>
+            <a:pPr algn="ctr"/>
+            <a:endParaRPr lang="en-US"/>
+          </a:p>
+        </p:txBody>
+      </p:sp>
     </p:spTree>
     <p:extLst>
       <p:ext uri="{BB962C8B-B14F-4D97-AF65-F5344CB8AC3E}">
@@ -21295,10 +21409,10 @@
       </p:grpSpPr>
       <p:pic>
         <p:nvPicPr>
-          <p:cNvPr id="11" name="Picture 10" descr="Chart, bar chart&#10;&#10;Description automatically generated">
+          <p:cNvPr id="27" name="Picture 26" descr="Chart, bar chart&#10;&#10;Description automatically generated">
             <a:extLst>
               <a:ext uri="{FF2B5EF4-FFF2-40B4-BE49-F238E27FC236}">
-                <a16:creationId xmlns:a16="http://schemas.microsoft.com/office/drawing/2014/main" id="{DBB2DCF6-FC89-E4A3-C9B8-88064B735BB9}"/>
+                <a16:creationId xmlns:a16="http://schemas.microsoft.com/office/drawing/2014/main" id="{5E271D16-5E55-B4C0-E7A5-AD9343C88F3C}"/>
               </a:ext>
             </a:extLst>
           </p:cNvPr>
@@ -21315,14 +21429,223 @@
         </p:blipFill>
         <p:spPr>
           <a:xfrm>
-            <a:off x="184615" y="501703"/>
-            <a:ext cx="11822770" cy="5854594"/>
+            <a:off x="214074" y="469850"/>
+            <a:ext cx="11763852" cy="5825418"/>
           </a:xfrm>
           <a:prstGeom prst="rect">
             <a:avLst/>
           </a:prstGeom>
         </p:spPr>
       </p:pic>
+      <p:sp>
+        <p:nvSpPr>
+          <p:cNvPr id="12" name="TextBox 11">
+            <a:extLst>
+              <a:ext uri="{FF2B5EF4-FFF2-40B4-BE49-F238E27FC236}">
+                <a16:creationId xmlns:a16="http://schemas.microsoft.com/office/drawing/2014/main" id="{ABB5BFA3-5474-51F6-7BA5-CA12A8CE88FC}"/>
+              </a:ext>
+            </a:extLst>
+          </p:cNvPr>
+          <p:cNvSpPr txBox="1"/>
+          <p:nvPr/>
+        </p:nvSpPr>
+        <p:spPr>
+          <a:xfrm>
+            <a:off x="444843" y="1186249"/>
+            <a:ext cx="5214552" cy="369332"/>
+          </a:xfrm>
+          <a:prstGeom prst="rect">
+            <a:avLst/>
+          </a:prstGeom>
+          <a:solidFill>
+            <a:schemeClr val="bg1"/>
+          </a:solidFill>
+        </p:spPr>
+        <p:txBody>
+          <a:bodyPr wrap="square" rtlCol="0">
+            <a:spAutoFit/>
+          </a:bodyPr>
+          <a:lstStyle/>
+          <a:p>
+            <a:r>
+              <a:rPr lang="en-US" dirty="0"/>
+              <a:t>               </a:t>
+            </a:r>
+            <a:r>
+              <a:rPr lang="en-US" dirty="0" err="1"/>
+              <a:t>SoundAsleep</a:t>
+            </a:r>
+            <a:r>
+              <a:rPr lang="en-US" dirty="0"/>
+              <a:t> Dream Series Air Mattress</a:t>
+            </a:r>
+          </a:p>
+        </p:txBody>
+      </p:sp>
+      <p:sp>
+        <p:nvSpPr>
+          <p:cNvPr id="13" name="TextBox 12">
+            <a:extLst>
+              <a:ext uri="{FF2B5EF4-FFF2-40B4-BE49-F238E27FC236}">
+                <a16:creationId xmlns:a16="http://schemas.microsoft.com/office/drawing/2014/main" id="{834E2830-3498-960A-825B-800097BF68EC}"/>
+              </a:ext>
+            </a:extLst>
+          </p:cNvPr>
+          <p:cNvSpPr txBox="1"/>
+          <p:nvPr/>
+        </p:nvSpPr>
+        <p:spPr>
+          <a:xfrm>
+            <a:off x="444843" y="2167014"/>
+            <a:ext cx="5214552" cy="369332"/>
+          </a:xfrm>
+          <a:prstGeom prst="rect">
+            <a:avLst/>
+          </a:prstGeom>
+          <a:solidFill>
+            <a:schemeClr val="bg1"/>
+          </a:solidFill>
+        </p:spPr>
+        <p:txBody>
+          <a:bodyPr wrap="square" rtlCol="0">
+            <a:spAutoFit/>
+          </a:bodyPr>
+          <a:lstStyle/>
+          <a:p>
+            <a:r>
+              <a:rPr lang="en-US" dirty="0"/>
+              <a:t>               </a:t>
+            </a:r>
+            <a:r>
+              <a:rPr lang="en-US" dirty="0" err="1"/>
+              <a:t>Intex</a:t>
+            </a:r>
+            <a:r>
+              <a:rPr lang="en-US" dirty="0"/>
+              <a:t> Pillow Rest Raised Airbed</a:t>
+            </a:r>
+          </a:p>
+        </p:txBody>
+      </p:sp>
+      <p:sp>
+        <p:nvSpPr>
+          <p:cNvPr id="14" name="TextBox 13">
+            <a:extLst>
+              <a:ext uri="{FF2B5EF4-FFF2-40B4-BE49-F238E27FC236}">
+                <a16:creationId xmlns:a16="http://schemas.microsoft.com/office/drawing/2014/main" id="{C276A34A-BF6E-5F69-764A-56C4CB808450}"/>
+              </a:ext>
+            </a:extLst>
+          </p:cNvPr>
+          <p:cNvSpPr txBox="1"/>
+          <p:nvPr/>
+        </p:nvSpPr>
+        <p:spPr>
+          <a:xfrm>
+            <a:off x="1075037" y="3114827"/>
+            <a:ext cx="4584358" cy="369332"/>
+          </a:xfrm>
+          <a:prstGeom prst="rect">
+            <a:avLst/>
+          </a:prstGeom>
+          <a:solidFill>
+            <a:schemeClr val="bg1"/>
+          </a:solidFill>
+        </p:spPr>
+        <p:txBody>
+          <a:bodyPr wrap="square" rtlCol="0">
+            <a:spAutoFit/>
+          </a:bodyPr>
+          <a:lstStyle/>
+          <a:p>
+            <a:r>
+              <a:rPr lang="en-US" dirty="0"/>
+              <a:t>     Hydro Flask Insulated Water Bottle</a:t>
+            </a:r>
+          </a:p>
+        </p:txBody>
+      </p:sp>
+      <p:sp>
+        <p:nvSpPr>
+          <p:cNvPr id="15" name="TextBox 14">
+            <a:extLst>
+              <a:ext uri="{FF2B5EF4-FFF2-40B4-BE49-F238E27FC236}">
+                <a16:creationId xmlns:a16="http://schemas.microsoft.com/office/drawing/2014/main" id="{EACEE23C-4E57-9405-0585-D48061100546}"/>
+              </a:ext>
+            </a:extLst>
+          </p:cNvPr>
+          <p:cNvSpPr txBox="1"/>
+          <p:nvPr/>
+        </p:nvSpPr>
+        <p:spPr>
+          <a:xfrm>
+            <a:off x="465436" y="4081053"/>
+            <a:ext cx="5214552" cy="369332"/>
+          </a:xfrm>
+          <a:prstGeom prst="rect">
+            <a:avLst/>
+          </a:prstGeom>
+          <a:solidFill>
+            <a:schemeClr val="bg1"/>
+          </a:solidFill>
+        </p:spPr>
+        <p:txBody>
+          <a:bodyPr wrap="square" rtlCol="0">
+            <a:spAutoFit/>
+          </a:bodyPr>
+          <a:lstStyle/>
+          <a:p>
+            <a:r>
+              <a:rPr lang="en-US" dirty="0"/>
+              <a:t>               </a:t>
+            </a:r>
+            <a:r>
+              <a:rPr lang="en-US" dirty="0" err="1"/>
+              <a:t>Intex</a:t>
+            </a:r>
+            <a:r>
+              <a:rPr lang="en-US" dirty="0"/>
+              <a:t> Raised Downy Airbed</a:t>
+            </a:r>
+          </a:p>
+        </p:txBody>
+      </p:sp>
+      <p:sp>
+        <p:nvSpPr>
+          <p:cNvPr id="16" name="TextBox 15">
+            <a:extLst>
+              <a:ext uri="{FF2B5EF4-FFF2-40B4-BE49-F238E27FC236}">
+                <a16:creationId xmlns:a16="http://schemas.microsoft.com/office/drawing/2014/main" id="{BDADE862-F13E-FF45-4C3F-EB44211F350D}"/>
+              </a:ext>
+            </a:extLst>
+          </p:cNvPr>
+          <p:cNvSpPr txBox="1"/>
+          <p:nvPr/>
+        </p:nvSpPr>
+        <p:spPr>
+          <a:xfrm>
+            <a:off x="407038" y="5071002"/>
+            <a:ext cx="5272949" cy="369332"/>
+          </a:xfrm>
+          <a:prstGeom prst="rect">
+            <a:avLst/>
+          </a:prstGeom>
+          <a:solidFill>
+            <a:schemeClr val="bg1"/>
+          </a:solidFill>
+        </p:spPr>
+        <p:txBody>
+          <a:bodyPr wrap="square" rtlCol="0">
+            <a:spAutoFit/>
+          </a:bodyPr>
+          <a:lstStyle/>
+          <a:p>
+            <a:r>
+              <a:rPr lang="en-US" dirty="0"/>
+              <a:t>                LifeStraw Personal Water Filter for Camping</a:t>
+            </a:r>
+          </a:p>
+        </p:txBody>
+      </p:sp>
     </p:spTree>
     <p:extLst>
       <p:ext uri="{BB962C8B-B14F-4D97-AF65-F5344CB8AC3E}">
@@ -21363,10 +21686,10 @@
       </p:grpSpPr>
       <p:sp useBgFill="1">
         <p:nvSpPr>
-          <p:cNvPr id="9" name="Rectangle 8">
+          <p:cNvPr id="23" name="Rectangle 22">
             <a:extLst>
               <a:ext uri="{FF2B5EF4-FFF2-40B4-BE49-F238E27FC236}">
-                <a16:creationId xmlns:a16="http://schemas.microsoft.com/office/drawing/2014/main" id="{158E38A4-F699-490C-8D1F-E8AD332D9B45}"/>
+                <a16:creationId xmlns:a16="http://schemas.microsoft.com/office/drawing/2014/main" id="{7B22176A-41DB-4D9A-9B6F-F2296F1ED173}"/>
               </a:ext>
               <a:ext uri="{C183D7F6-B498-43B3-948B-1728B52AA6E4}">
                 <adec:decorative xmlns:adec="http://schemas.microsoft.com/office/drawing/2017/decorative" val="1"/>
@@ -21426,10 +21749,10 @@
       </p:sp>
       <p:sp>
         <p:nvSpPr>
-          <p:cNvPr id="11" name="Rectangle 10">
+          <p:cNvPr id="25" name="Rectangle 24">
             <a:extLst>
               <a:ext uri="{FF2B5EF4-FFF2-40B4-BE49-F238E27FC236}">
-                <a16:creationId xmlns:a16="http://schemas.microsoft.com/office/drawing/2014/main" id="{939C6AAB-48AC-41A3-95C2-6BF83715DF62}"/>
+                <a16:creationId xmlns:a16="http://schemas.microsoft.com/office/drawing/2014/main" id="{774A8DF5-445E-49C5-B10A-8DF5FEFBCC46}"/>
               </a:ext>
               <a:ext uri="{C183D7F6-B498-43B3-948B-1728B52AA6E4}">
                 <adec:decorative xmlns:adec="http://schemas.microsoft.com/office/drawing/2017/decorative" val="1"/>
@@ -21450,7 +21773,7 @@
         <p:spPr>
           <a:xfrm>
             <a:off x="0" y="0"/>
-            <a:ext cx="7620000" cy="6858000"/>
+            <a:ext cx="12192000" cy="6858000"/>
           </a:xfrm>
           <a:prstGeom prst="rect">
             <a:avLst/>
@@ -21492,10 +21815,10 @@
       </p:sp>
       <p:sp>
         <p:nvSpPr>
-          <p:cNvPr id="13" name="Rectangle 12">
+          <p:cNvPr id="27" name="Rectangle 26">
             <a:extLst>
               <a:ext uri="{FF2B5EF4-FFF2-40B4-BE49-F238E27FC236}">
-                <a16:creationId xmlns:a16="http://schemas.microsoft.com/office/drawing/2014/main" id="{F6EE861B-7D2F-4B7C-A6E3-5937E81B8025}"/>
+                <a16:creationId xmlns:a16="http://schemas.microsoft.com/office/drawing/2014/main" id="{9A4E38D9-EFB8-40B5-B42B-514FBF180360}"/>
               </a:ext>
               <a:ext uri="{C183D7F6-B498-43B3-948B-1728B52AA6E4}">
                 <adec:decorative xmlns:adec="http://schemas.microsoft.com/office/drawing/2017/decorative" val="1"/>
@@ -21515,8 +21838,8 @@
         </p:nvSpPr>
         <p:spPr>
           <a:xfrm>
-            <a:off x="153081" y="159026"/>
-            <a:ext cx="7313839" cy="6542788"/>
+            <a:off x="160920" y="157606"/>
+            <a:ext cx="11870161" cy="6542788"/>
           </a:xfrm>
           <a:prstGeom prst="rect">
             <a:avLst/>
@@ -21571,19 +21894,19 @@
         </p:nvSpPr>
         <p:spPr>
           <a:xfrm>
-            <a:off x="1077426" y="723901"/>
-            <a:ext cx="5465148" cy="1288884"/>
+            <a:off x="1688122" y="306820"/>
+            <a:ext cx="8815754" cy="633711"/>
           </a:xfrm>
         </p:spPr>
         <p:txBody>
           <a:bodyPr anchor="b">
-            <a:normAutofit/>
+            <a:noAutofit/>
           </a:bodyPr>
           <a:lstStyle/>
           <a:p>
             <a:pPr algn="ctr"/>
             <a:r>
-              <a:rPr lang="en-US" dirty="0"/>
+              <a:rPr lang="en-US" sz="3600" dirty="0"/>
               <a:t>Item-to-item Retrieval Model</a:t>
             </a:r>
           </a:p>
@@ -21607,62 +21930,36 @@
         </p:nvSpPr>
         <p:spPr>
           <a:xfrm>
-            <a:off x="1077426" y="2732545"/>
-            <a:ext cx="5465149" cy="862571"/>
+            <a:off x="3069194" y="867064"/>
+            <a:ext cx="6221845" cy="633712"/>
           </a:xfrm>
+          <a:noFill/>
+          <a:ln>
+            <a:solidFill>
+              <a:schemeClr val="bg1"/>
+            </a:solidFill>
+          </a:ln>
         </p:spPr>
         <p:txBody>
-          <a:bodyPr anchor="t">
+          <a:bodyPr anchor="ctr">
             <a:normAutofit/>
           </a:bodyPr>
           <a:lstStyle/>
           <a:p>
             <a:pPr algn="ctr"/>
             <a:r>
-              <a:rPr lang="en-US"/>
+              <a:rPr lang="en-US" dirty="0"/>
               <a:t>Accuracy rate of  Top-10 recommendations is 63.26%</a:t>
             </a:r>
-            <a:endParaRPr lang="en-US" dirty="0"/>
           </a:p>
         </p:txBody>
       </p:sp>
-      <p:pic>
-        <p:nvPicPr>
-          <p:cNvPr id="5" name="Picture 4" descr="Red toy person in front of two lines of white figures">
+      <p:grpSp>
+        <p:nvGrpSpPr>
+          <p:cNvPr id="29" name="Group 28">
             <a:extLst>
               <a:ext uri="{FF2B5EF4-FFF2-40B4-BE49-F238E27FC236}">
-                <a16:creationId xmlns:a16="http://schemas.microsoft.com/office/drawing/2014/main" id="{C3E40543-F33A-FDD1-B693-060B2715A820}"/>
-              </a:ext>
-            </a:extLst>
-          </p:cNvPr>
-          <p:cNvPicPr>
-            <a:picLocks noChangeAspect="1"/>
-          </p:cNvPicPr>
-          <p:nvPr/>
-        </p:nvPicPr>
-        <p:blipFill rotWithShape="1">
-          <a:blip r:embed="rId3">
-            <a:alphaModFix/>
-          </a:blip>
-          <a:srcRect l="30011" r="26156"/>
-          <a:stretch/>
-        </p:blipFill>
-        <p:spPr>
-          <a:xfrm>
-            <a:off x="7620000" y="10"/>
-            <a:ext cx="4572000" cy="4720271"/>
-          </a:xfrm>
-          <a:prstGeom prst="rect">
-            <a:avLst/>
-          </a:prstGeom>
-        </p:spPr>
-      </p:pic>
-      <p:grpSp>
-        <p:nvGrpSpPr>
-          <p:cNvPr id="15" name="Group 14">
-            <a:extLst>
-              <a:ext uri="{FF2B5EF4-FFF2-40B4-BE49-F238E27FC236}">
-                <a16:creationId xmlns:a16="http://schemas.microsoft.com/office/drawing/2014/main" id="{073091F1-AA5A-47C6-9502-D5870A72D50C}"/>
+                <a16:creationId xmlns:a16="http://schemas.microsoft.com/office/drawing/2014/main" id="{1148C992-36DE-4449-B92D-49AE04B5DE20}"/>
               </a:ext>
               <a:ext uri="{C183D7F6-B498-43B3-948B-1728B52AA6E4}">
                 <adec:decorative xmlns:adec="http://schemas.microsoft.com/office/drawing/2017/decorative" val="1"/>
@@ -21682,7 +21979,7 @@
         </p:nvGrpSpPr>
         <p:grpSpPr>
           <a:xfrm>
-            <a:off x="3376258" y="2320171"/>
+            <a:off x="5662258" y="2345189"/>
             <a:ext cx="867485" cy="115439"/>
             <a:chOff x="8910933" y="1861308"/>
             <a:chExt cx="867485" cy="115439"/>
@@ -21690,10 +21987,10 @@
         </p:grpSpPr>
         <p:sp>
           <p:nvSpPr>
-            <p:cNvPr id="16" name="Rectangle 15">
+            <p:cNvPr id="30" name="Rectangle 29">
               <a:extLst>
                 <a:ext uri="{FF2B5EF4-FFF2-40B4-BE49-F238E27FC236}">
-                  <a16:creationId xmlns:a16="http://schemas.microsoft.com/office/drawing/2014/main" id="{8085C4F7-6E91-4DF6-BB01-A46132BC3587}"/>
+                  <a16:creationId xmlns:a16="http://schemas.microsoft.com/office/drawing/2014/main" id="{D765B2C1-DF41-437F-9F2D-C33E46FA2644}"/>
                 </a:ext>
                 <a:ext uri="{C183D7F6-B498-43B3-948B-1728B52AA6E4}">
                   <adec:decorative xmlns:adec="http://schemas.microsoft.com/office/drawing/2017/decorative" val="1"/>
@@ -21745,27 +22042,16 @@
             <a:lstStyle/>
             <a:p>
               <a:pPr algn="ctr"/>
-              <a:endParaRPr lang="en-US">
-                <a:solidFill>
-                  <a:schemeClr val="bg1"/>
-                </a:solidFill>
-                <a:effectLst>
-                  <a:outerShdw blurRad="38100" dist="38100" dir="2700000" algn="tl">
-                    <a:srgbClr val="000000">
-                      <a:alpha val="43137"/>
-                    </a:srgbClr>
-                  </a:outerShdw>
-                </a:effectLst>
-              </a:endParaRPr>
+              <a:endParaRPr lang="en-US"/>
             </a:p>
           </p:txBody>
         </p:sp>
         <p:cxnSp>
           <p:nvCxnSpPr>
-            <p:cNvPr id="17" name="Straight Connector 16">
+            <p:cNvPr id="31" name="Straight Connector 30">
               <a:extLst>
                 <a:ext uri="{FF2B5EF4-FFF2-40B4-BE49-F238E27FC236}">
-                  <a16:creationId xmlns:a16="http://schemas.microsoft.com/office/drawing/2014/main" id="{25476588-B9AD-4662-A085-8E4D91493B3F}"/>
+                  <a16:creationId xmlns:a16="http://schemas.microsoft.com/office/drawing/2014/main" id="{B6AA37ED-ED19-4857-9B2C-777E8F707C61}"/>
                 </a:ext>
                 <a:ext uri="{C183D7F6-B498-43B3-948B-1728B52AA6E4}">
                   <adec:decorative xmlns:adec="http://schemas.microsoft.com/office/drawing/2017/decorative" val="1"/>
@@ -21812,10 +22098,10 @@
         </p:cxnSp>
         <p:cxnSp>
           <p:nvCxnSpPr>
-            <p:cNvPr id="18" name="Straight Connector 17">
+            <p:cNvPr id="32" name="Straight Connector 31">
               <a:extLst>
                 <a:ext uri="{FF2B5EF4-FFF2-40B4-BE49-F238E27FC236}">
-                  <a16:creationId xmlns:a16="http://schemas.microsoft.com/office/drawing/2014/main" id="{BCDB34B3-D348-476E-BE7F-1139370F4310}"/>
+                  <a16:creationId xmlns:a16="http://schemas.microsoft.com/office/drawing/2014/main" id="{C45F6E87-86FB-440C-9EB4-A48D11C72CF9}"/>
                 </a:ext>
                 <a:ext uri="{C183D7F6-B498-43B3-948B-1728B52AA6E4}">
                   <adec:decorative xmlns:adec="http://schemas.microsoft.com/office/drawing/2017/decorative" val="1"/>
@@ -21863,10 +22149,40 @@
       </p:grpSp>
       <p:pic>
         <p:nvPicPr>
-          <p:cNvPr id="6" name="Picture 5" descr="Text&#10;&#10;Description automatically generated">
+          <p:cNvPr id="8" name="Picture 7">
             <a:extLst>
               <a:ext uri="{FF2B5EF4-FFF2-40B4-BE49-F238E27FC236}">
-                <a16:creationId xmlns:a16="http://schemas.microsoft.com/office/drawing/2014/main" id="{043666CC-804C-DD92-549E-4AA5B5686976}"/>
+                <a16:creationId xmlns:a16="http://schemas.microsoft.com/office/drawing/2014/main" id="{B1EDEF5A-BBA3-8286-1BDA-171BACB85255}"/>
+              </a:ext>
+            </a:extLst>
+          </p:cNvPr>
+          <p:cNvPicPr>
+            <a:picLocks noChangeAspect="1"/>
+          </p:cNvPicPr>
+          <p:nvPr/>
+        </p:nvPicPr>
+        <p:blipFill>
+          <a:blip r:embed="rId3"/>
+          <a:stretch>
+            <a:fillRect/>
+          </a:stretch>
+        </p:blipFill>
+        <p:spPr>
+          <a:xfrm>
+            <a:off x="9183831" y="3945140"/>
+            <a:ext cx="2549528" cy="2549528"/>
+          </a:xfrm>
+          <a:prstGeom prst="rect">
+            <a:avLst/>
+          </a:prstGeom>
+        </p:spPr>
+      </p:pic>
+      <p:pic>
+        <p:nvPicPr>
+          <p:cNvPr id="20" name="Picture 19" descr="A picture containing indoor, green&#10;&#10;Description automatically generated">
+            <a:extLst>
+              <a:ext uri="{FF2B5EF4-FFF2-40B4-BE49-F238E27FC236}">
+                <a16:creationId xmlns:a16="http://schemas.microsoft.com/office/drawing/2014/main" id="{AB8EA3AD-DA5F-C63D-2DD6-AC7D2CE82933}"/>
               </a:ext>
             </a:extLst>
           </p:cNvPr>
@@ -21883,8 +22199,188 @@
         </p:blipFill>
         <p:spPr>
           <a:xfrm>
-            <a:off x="349542" y="4205073"/>
-            <a:ext cx="11562372" cy="2262658"/>
+            <a:off x="3376244" y="4285260"/>
+            <a:ext cx="2893907" cy="1793927"/>
+          </a:xfrm>
+          <a:prstGeom prst="rect">
+            <a:avLst/>
+          </a:prstGeom>
+        </p:spPr>
+      </p:pic>
+      <p:pic>
+        <p:nvPicPr>
+          <p:cNvPr id="22" name="Picture 21" descr="A black hat with a strap&#10;&#10;Description automatically generated with low confidence">
+            <a:extLst>
+              <a:ext uri="{FF2B5EF4-FFF2-40B4-BE49-F238E27FC236}">
+                <a16:creationId xmlns:a16="http://schemas.microsoft.com/office/drawing/2014/main" id="{86E1CD3F-5014-38F6-82E6-C6BBDF94AB06}"/>
+              </a:ext>
+            </a:extLst>
+          </p:cNvPr>
+          <p:cNvPicPr>
+            <a:picLocks noChangeAspect="1"/>
+          </p:cNvPicPr>
+          <p:nvPr/>
+        </p:nvPicPr>
+        <p:blipFill>
+          <a:blip r:embed="rId5"/>
+          <a:stretch>
+            <a:fillRect/>
+          </a:stretch>
+        </p:blipFill>
+        <p:spPr>
+          <a:xfrm>
+            <a:off x="8869926" y="1449283"/>
+            <a:ext cx="2671136" cy="1626965"/>
+          </a:xfrm>
+          <a:prstGeom prst="rect">
+            <a:avLst/>
+          </a:prstGeom>
+        </p:spPr>
+      </p:pic>
+      <p:pic>
+        <p:nvPicPr>
+          <p:cNvPr id="47" name="Picture 46" descr="A close-up of a tire&#10;&#10;Description automatically generated with medium confidence">
+            <a:extLst>
+              <a:ext uri="{FF2B5EF4-FFF2-40B4-BE49-F238E27FC236}">
+                <a16:creationId xmlns:a16="http://schemas.microsoft.com/office/drawing/2014/main" id="{9F1B1EFC-7FEF-2162-C24F-99F80A77A562}"/>
+              </a:ext>
+            </a:extLst>
+          </p:cNvPr>
+          <p:cNvPicPr>
+            <a:picLocks noChangeAspect="1"/>
+          </p:cNvPicPr>
+          <p:nvPr/>
+        </p:nvPicPr>
+        <p:blipFill>
+          <a:blip r:embed="rId6"/>
+          <a:stretch>
+            <a:fillRect/>
+          </a:stretch>
+        </p:blipFill>
+        <p:spPr>
+          <a:xfrm>
+            <a:off x="174653" y="141379"/>
+            <a:ext cx="2857500" cy="2857500"/>
+          </a:xfrm>
+          <a:prstGeom prst="rect">
+            <a:avLst/>
+          </a:prstGeom>
+        </p:spPr>
+      </p:pic>
+      <p:pic>
+        <p:nvPicPr>
+          <p:cNvPr id="49" name="Picture 48" descr="A picture containing accessory&#10;&#10;Description automatically generated">
+            <a:extLst>
+              <a:ext uri="{FF2B5EF4-FFF2-40B4-BE49-F238E27FC236}">
+                <a16:creationId xmlns:a16="http://schemas.microsoft.com/office/drawing/2014/main" id="{D1AF808C-2C54-7E40-8FF9-6AAA3CE42460}"/>
+              </a:ext>
+            </a:extLst>
+          </p:cNvPr>
+          <p:cNvPicPr>
+            <a:picLocks noChangeAspect="1"/>
+          </p:cNvPicPr>
+          <p:nvPr/>
+        </p:nvPicPr>
+        <p:blipFill>
+          <a:blip r:embed="rId7"/>
+          <a:stretch>
+            <a:fillRect/>
+          </a:stretch>
+        </p:blipFill>
+        <p:spPr>
+          <a:xfrm>
+            <a:off x="6150561" y="3691099"/>
+            <a:ext cx="3009283" cy="3009283"/>
+          </a:xfrm>
+          <a:prstGeom prst="rect">
+            <a:avLst/>
+          </a:prstGeom>
+        </p:spPr>
+      </p:pic>
+      <p:pic>
+        <p:nvPicPr>
+          <p:cNvPr id="14" name="Picture 13" descr="A picture containing green, accessory, parked, bag&#10;&#10;Description automatically generated">
+            <a:extLst>
+              <a:ext uri="{FF2B5EF4-FFF2-40B4-BE49-F238E27FC236}">
+                <a16:creationId xmlns:a16="http://schemas.microsoft.com/office/drawing/2014/main" id="{BA27873C-4F96-15FE-8974-1ECC14C049D3}"/>
+              </a:ext>
+            </a:extLst>
+          </p:cNvPr>
+          <p:cNvPicPr>
+            <a:picLocks noChangeAspect="1"/>
+          </p:cNvPicPr>
+          <p:nvPr/>
+        </p:nvPicPr>
+        <p:blipFill>
+          <a:blip r:embed="rId8"/>
+          <a:stretch>
+            <a:fillRect/>
+          </a:stretch>
+        </p:blipFill>
+        <p:spPr>
+          <a:xfrm>
+            <a:off x="157772" y="3919094"/>
+            <a:ext cx="3060700" cy="2781300"/>
+          </a:xfrm>
+          <a:prstGeom prst="rect">
+            <a:avLst/>
+          </a:prstGeom>
+        </p:spPr>
+      </p:pic>
+      <p:pic>
+        <p:nvPicPr>
+          <p:cNvPr id="51" name="Picture 50" descr="A picture containing outdoor object, tent, accessory, sport kite&#10;&#10;Description automatically generated">
+            <a:extLst>
+              <a:ext uri="{FF2B5EF4-FFF2-40B4-BE49-F238E27FC236}">
+                <a16:creationId xmlns:a16="http://schemas.microsoft.com/office/drawing/2014/main" id="{F41AAC00-272A-E71D-16AB-5EFBF1D5A775}"/>
+              </a:ext>
+            </a:extLst>
+          </p:cNvPr>
+          <p:cNvPicPr>
+            <a:picLocks noChangeAspect="1"/>
+          </p:cNvPicPr>
+          <p:nvPr/>
+        </p:nvPicPr>
+        <p:blipFill>
+          <a:blip r:embed="rId9"/>
+          <a:stretch>
+            <a:fillRect/>
+          </a:stretch>
+        </p:blipFill>
+        <p:spPr>
+          <a:xfrm>
+            <a:off x="4180389" y="1517809"/>
+            <a:ext cx="4061911" cy="2370679"/>
+          </a:xfrm>
+          <a:prstGeom prst="rect">
+            <a:avLst/>
+          </a:prstGeom>
+        </p:spPr>
+      </p:pic>
+      <p:pic>
+        <p:nvPicPr>
+          <p:cNvPr id="33" name="Picture 32">
+            <a:extLst>
+              <a:ext uri="{FF2B5EF4-FFF2-40B4-BE49-F238E27FC236}">
+                <a16:creationId xmlns:a16="http://schemas.microsoft.com/office/drawing/2014/main" id="{12FFE15B-DDC1-32B6-B90E-495EF906CC91}"/>
+              </a:ext>
+            </a:extLst>
+          </p:cNvPr>
+          <p:cNvPicPr>
+            <a:picLocks noChangeAspect="1"/>
+          </p:cNvPicPr>
+          <p:nvPr/>
+        </p:nvPicPr>
+        <p:blipFill>
+          <a:blip r:embed="rId10"/>
+          <a:stretch>
+            <a:fillRect/>
+          </a:stretch>
+        </p:blipFill>
+        <p:spPr>
+          <a:xfrm>
+            <a:off x="1582171" y="2998879"/>
+            <a:ext cx="1739900" cy="1155700"/>
           </a:xfrm>
           <a:prstGeom prst="rect">
             <a:avLst/>

</xml_diff>

<commit_message>
minor revisions in presentation and EDA
</commit_message>
<xml_diff>
--- a/Presentation1.pptx
+++ b/Presentation1.pptx
@@ -4182,7 +4182,7 @@
             </a:lnSpc>
           </a:pPr>
           <a:r>
-            <a:rPr lang="en-US"/>
+            <a:rPr lang="en-US" dirty="0"/>
             <a:t>A/B test item-to-item Retrieval TensorFlow model on the website. </a:t>
           </a:r>
         </a:p>
@@ -4443,8 +4443,16 @@
         <a:lstStyle/>
         <a:p>
           <a:r>
-            <a:rPr lang="en-US" sz="1600"/>
-            <a:t>Scrub current data from Amazon.com to run the models on the up-to-date dataset. </a:t>
+            <a:rPr lang="en-US" sz="1600" dirty="0"/>
+            <a:t>Scrub current data from </a:t>
+          </a:r>
+          <a:r>
+            <a:rPr lang="en-US" sz="1600" dirty="0" err="1"/>
+            <a:t>Amazon.com</a:t>
+          </a:r>
+          <a:r>
+            <a:rPr lang="en-US" sz="1600" dirty="0"/>
+            <a:t> to run the models on the up-to-date dataset. </a:t>
           </a:r>
         </a:p>
       </dgm:t>
@@ -4519,7 +4527,7 @@
         <a:lstStyle/>
         <a:p>
           <a:r>
-            <a:rPr lang="en-US" sz="1600"/>
+            <a:rPr lang="en-US" sz="1600" dirty="0"/>
             <a:t>Further explore TensorFlow Recommenders to build advanced machine learning models. </a:t>
           </a:r>
         </a:p>
@@ -4595,7 +4603,7 @@
         <a:lstStyle/>
         <a:p>
           <a:r>
-            <a:rPr lang="en-US" sz="1600"/>
+            <a:rPr lang="en-US" sz="1600" dirty="0"/>
             <a:t>Incorporate time series data to fine tune Sequential models (RNN: Recurrent Neural Networks). </a:t>
           </a:r>
         </a:p>
@@ -4671,7 +4679,7 @@
         <a:lstStyle/>
         <a:p>
           <a:r>
-            <a:rPr lang="en-US" sz="1600"/>
+            <a:rPr lang="en-US" sz="1600" dirty="0"/>
             <a:t>Run Convolutional Neural Networks (CNN) on image and video data. </a:t>
           </a:r>
         </a:p>
@@ -5790,7 +5798,7 @@
             <a:buNone/>
           </a:pPr>
           <a:r>
-            <a:rPr lang="en-US" sz="2500" kern="1200"/>
+            <a:rPr lang="en-US" sz="2500" kern="1200" dirty="0"/>
             <a:t>A/B test item-to-item Retrieval TensorFlow model on the website. </a:t>
           </a:r>
         </a:p>
@@ -6065,7 +6073,7 @@
             <a:buNone/>
           </a:pPr>
           <a:r>
-            <a:rPr lang="en-US" sz="1600" kern="1200"/>
+            <a:rPr lang="en-US" sz="1600" kern="1200" dirty="0"/>
             <a:t>Run Convolutional Neural Networks (CNN) on image and video data. </a:t>
           </a:r>
         </a:p>
@@ -6223,7 +6231,7 @@
             <a:buNone/>
           </a:pPr>
           <a:r>
-            <a:rPr lang="en-US" sz="1600" kern="1200"/>
+            <a:rPr lang="en-US" sz="1600" kern="1200" dirty="0"/>
             <a:t>Incorporate time series data to fine tune Sequential models (RNN: Recurrent Neural Networks). </a:t>
           </a:r>
         </a:p>
@@ -6381,7 +6389,7 @@
             <a:buNone/>
           </a:pPr>
           <a:r>
-            <a:rPr lang="en-US" sz="1600" kern="1200"/>
+            <a:rPr lang="en-US" sz="1600" kern="1200" dirty="0"/>
             <a:t>Further explore TensorFlow Recommenders to build advanced machine learning models. </a:t>
           </a:r>
         </a:p>
@@ -6539,8 +6547,16 @@
             <a:buNone/>
           </a:pPr>
           <a:r>
-            <a:rPr lang="en-US" sz="1600" kern="1200"/>
-            <a:t>Scrub current data from Amazon.com to run the models on the up-to-date dataset. </a:t>
+            <a:rPr lang="en-US" sz="1600" kern="1200" dirty="0"/>
+            <a:t>Scrub current data from </a:t>
+          </a:r>
+          <a:r>
+            <a:rPr lang="en-US" sz="1600" kern="1200" dirty="0" err="1"/>
+            <a:t>Amazon.com</a:t>
+          </a:r>
+          <a:r>
+            <a:rPr lang="en-US" sz="1600" kern="1200" dirty="0"/>
+            <a:t> to run the models on the up-to-date dataset. </a:t>
           </a:r>
         </a:p>
       </dsp:txBody>
@@ -19233,7 +19249,7 @@
         </p:blipFill>
         <p:spPr>
           <a:xfrm>
-            <a:off x="20" y="10"/>
+            <a:off x="12720" y="10"/>
             <a:ext cx="12191979" cy="6869638"/>
           </a:xfrm>
           <a:prstGeom prst="rect">
@@ -19259,8 +19275,8 @@
         </p:nvSpPr>
         <p:spPr>
           <a:xfrm>
-            <a:off x="1008993" y="4600668"/>
-            <a:ext cx="6788076" cy="3416512"/>
+            <a:off x="920093" y="4668465"/>
+            <a:ext cx="6788076" cy="749508"/>
           </a:xfrm>
           <a:effectLst>
             <a:outerShdw blurRad="50800" dist="12700" dir="2700000" algn="tl" rotWithShape="0">
@@ -19279,57 +19295,28 @@
             <a:r>
               <a:rPr lang="en-US" sz="1800" dirty="0">
                 <a:solidFill>
-                  <a:schemeClr val="bg1"/>
+                  <a:schemeClr val="bg1">
+                    <a:lumMod val="65000"/>
+                    <a:lumOff val="35000"/>
+                  </a:schemeClr>
                 </a:solidFill>
+                <a:latin typeface="Arial Nova" panose="020F0502020204030204" pitchFamily="34" charset="0"/>
+                <a:cs typeface="Al Nile" pitchFamily="2" charset="-78"/>
               </a:rPr>
               <a:t>OBJECTIVE:  Explore Neural Networks by using TensorFlow Recommenders to address Cold Start problem. </a:t>
             </a:r>
           </a:p>
           <a:p>
-            <a:r>
-              <a:rPr lang="en-US" sz="1800" dirty="0">
-                <a:solidFill>
-                  <a:schemeClr val="bg1"/>
-                </a:solidFill>
-              </a:rPr>
-              <a:t>PROJECTED OUTCOME:</a:t>
-            </a:r>
-          </a:p>
-          <a:p>
-            <a:r>
-              <a:rPr lang="en-US" sz="1800" dirty="0">
-                <a:solidFill>
-                  <a:schemeClr val="bg1"/>
-                </a:solidFill>
-              </a:rPr>
-              <a:t>Test Retrieval, Ranking, and Sequential models </a:t>
-            </a:r>
-          </a:p>
-          <a:p>
-            <a:r>
-              <a:rPr lang="en-US" sz="1800" dirty="0">
-                <a:solidFill>
-                  <a:schemeClr val="bg1"/>
-                </a:solidFill>
-              </a:rPr>
-              <a:t>Test efficient serving (</a:t>
-            </a:r>
-            <a:r>
-              <a:rPr lang="en-US" sz="1800" dirty="0" err="1">
-                <a:solidFill>
-                  <a:schemeClr val="bg1"/>
-                </a:solidFill>
-              </a:rPr>
-              <a:t>ScaNN</a:t>
-            </a:r>
-            <a:r>
-              <a:rPr lang="en-US" sz="1800" dirty="0">
-                <a:solidFill>
-                  <a:schemeClr val="bg1"/>
-                </a:solidFill>
-              </a:rPr>
-              <a:t>) </a:t>
-            </a:r>
+            <a:endParaRPr lang="en-US" sz="1800" dirty="0">
+              <a:solidFill>
+                <a:schemeClr val="bg1">
+                  <a:lumMod val="65000"/>
+                  <a:lumOff val="35000"/>
+                </a:schemeClr>
+              </a:solidFill>
+              <a:latin typeface="Arial Nova" panose="020F0502020204030204" pitchFamily="34" charset="0"/>
+              <a:cs typeface="Al Nile" pitchFamily="2" charset="-78"/>
+            </a:endParaRPr>
           </a:p>
           <a:p>
             <a:pPr algn="ctr"/>
@@ -19569,6 +19556,266 @@
           </p:style>
         </p:cxnSp>
       </p:grpSp>
+      <p:sp>
+        <p:nvSpPr>
+          <p:cNvPr id="10" name="Content Placeholder 2">
+            <a:extLst>
+              <a:ext uri="{FF2B5EF4-FFF2-40B4-BE49-F238E27FC236}">
+                <a16:creationId xmlns:a16="http://schemas.microsoft.com/office/drawing/2014/main" id="{B2BD04E7-950D-F24E-39CA-62C7F646FD75}"/>
+              </a:ext>
+            </a:extLst>
+          </p:cNvPr>
+          <p:cNvSpPr txBox="1">
+            <a:spLocks/>
+          </p:cNvSpPr>
+          <p:nvPr/>
+        </p:nvSpPr>
+        <p:spPr>
+          <a:xfrm>
+            <a:off x="920093" y="5481473"/>
+            <a:ext cx="6788076" cy="749508"/>
+          </a:xfrm>
+          <a:prstGeom prst="rect">
+            <a:avLst/>
+          </a:prstGeom>
+          <a:effectLst>
+            <a:outerShdw blurRad="50800" dist="12700" dir="2700000" algn="tl" rotWithShape="0">
+              <a:prstClr val="black">
+                <a:alpha val="40000"/>
+              </a:prstClr>
+            </a:outerShdw>
+          </a:effectLst>
+        </p:spPr>
+        <p:txBody>
+          <a:bodyPr vert="horz" lIns="91440" tIns="45720" rIns="91440" bIns="45720" rtlCol="0">
+            <a:normAutofit/>
+          </a:bodyPr>
+          <a:lstStyle>
+            <a:lvl1pPr marL="0" indent="0" algn="l" defTabSz="914400" rtl="0" eaLnBrk="1" latinLnBrk="0" hangingPunct="1">
+              <a:lnSpc>
+                <a:spcPct val="110000"/>
+              </a:lnSpc>
+              <a:spcBef>
+                <a:spcPts val="1000"/>
+              </a:spcBef>
+              <a:buFontTx/>
+              <a:buNone/>
+              <a:defRPr sz="2000" kern="1200">
+                <a:solidFill>
+                  <a:schemeClr val="tx2"/>
+                </a:solidFill>
+                <a:latin typeface="+mn-lt"/>
+                <a:ea typeface="+mn-ea"/>
+                <a:cs typeface="+mn-cs"/>
+              </a:defRPr>
+            </a:lvl1pPr>
+            <a:lvl2pPr marL="274320" indent="-228600" algn="l" defTabSz="914400" rtl="0" eaLnBrk="1" latinLnBrk="0" hangingPunct="1">
+              <a:lnSpc>
+                <a:spcPct val="110000"/>
+              </a:lnSpc>
+              <a:spcBef>
+                <a:spcPts val="500"/>
+              </a:spcBef>
+              <a:buSzPct val="85000"/>
+              <a:buFont typeface="Arial" panose="020B0604020202020204" pitchFamily="34" charset="0"/>
+              <a:buChar char="•"/>
+              <a:defRPr sz="1800" kern="1200">
+                <a:solidFill>
+                  <a:schemeClr val="tx2"/>
+                </a:solidFill>
+                <a:latin typeface="+mn-lt"/>
+                <a:ea typeface="+mn-ea"/>
+                <a:cs typeface="+mn-cs"/>
+              </a:defRPr>
+            </a:lvl2pPr>
+            <a:lvl3pPr marL="274320" indent="0" algn="l" defTabSz="914400" rtl="0" eaLnBrk="1" latinLnBrk="0" hangingPunct="1">
+              <a:lnSpc>
+                <a:spcPct val="110000"/>
+              </a:lnSpc>
+              <a:spcBef>
+                <a:spcPts val="500"/>
+              </a:spcBef>
+              <a:buFontTx/>
+              <a:buNone/>
+              <a:defRPr sz="1600" kern="1200">
+                <a:solidFill>
+                  <a:schemeClr val="tx2"/>
+                </a:solidFill>
+                <a:latin typeface="+mn-lt"/>
+                <a:ea typeface="+mn-ea"/>
+                <a:cs typeface="+mn-cs"/>
+              </a:defRPr>
+            </a:lvl3pPr>
+            <a:lvl4pPr marL="548640" indent="-228600" algn="l" defTabSz="914400" rtl="0" eaLnBrk="1" latinLnBrk="0" hangingPunct="1">
+              <a:lnSpc>
+                <a:spcPct val="110000"/>
+              </a:lnSpc>
+              <a:spcBef>
+                <a:spcPts val="500"/>
+              </a:spcBef>
+              <a:buFont typeface="Arial" panose="020B0604020202020204" pitchFamily="34" charset="0"/>
+              <a:buChar char="•"/>
+              <a:defRPr sz="1400" kern="1200">
+                <a:solidFill>
+                  <a:schemeClr val="tx2"/>
+                </a:solidFill>
+                <a:latin typeface="+mn-lt"/>
+                <a:ea typeface="+mn-ea"/>
+                <a:cs typeface="+mn-cs"/>
+              </a:defRPr>
+            </a:lvl4pPr>
+            <a:lvl5pPr marL="548640" indent="0" algn="l" defTabSz="914400" rtl="0" eaLnBrk="1" latinLnBrk="0" hangingPunct="1">
+              <a:lnSpc>
+                <a:spcPct val="110000"/>
+              </a:lnSpc>
+              <a:spcBef>
+                <a:spcPts val="500"/>
+              </a:spcBef>
+              <a:buFontTx/>
+              <a:buNone/>
+              <a:defRPr sz="1400" kern="1200">
+                <a:solidFill>
+                  <a:schemeClr val="tx2"/>
+                </a:solidFill>
+                <a:latin typeface="+mn-lt"/>
+                <a:ea typeface="+mn-ea"/>
+                <a:cs typeface="+mn-cs"/>
+              </a:defRPr>
+            </a:lvl5pPr>
+            <a:lvl6pPr marL="2514600" indent="-228600" algn="l" defTabSz="914400" rtl="0" eaLnBrk="1" latinLnBrk="0" hangingPunct="1">
+              <a:lnSpc>
+                <a:spcPct val="90000"/>
+              </a:lnSpc>
+              <a:spcBef>
+                <a:spcPts val="500"/>
+              </a:spcBef>
+              <a:buFont typeface="Arial" panose="020B0604020202020204" pitchFamily="34" charset="0"/>
+              <a:buChar char="•"/>
+              <a:defRPr sz="1800" kern="1200">
+                <a:solidFill>
+                  <a:schemeClr val="tx1"/>
+                </a:solidFill>
+                <a:latin typeface="+mn-lt"/>
+                <a:ea typeface="+mn-ea"/>
+                <a:cs typeface="+mn-cs"/>
+              </a:defRPr>
+            </a:lvl6pPr>
+            <a:lvl7pPr marL="2971800" indent="-228600" algn="l" defTabSz="914400" rtl="0" eaLnBrk="1" latinLnBrk="0" hangingPunct="1">
+              <a:lnSpc>
+                <a:spcPct val="90000"/>
+              </a:lnSpc>
+              <a:spcBef>
+                <a:spcPts val="500"/>
+              </a:spcBef>
+              <a:buFont typeface="Arial" panose="020B0604020202020204" pitchFamily="34" charset="0"/>
+              <a:buChar char="•"/>
+              <a:defRPr sz="1800" kern="1200">
+                <a:solidFill>
+                  <a:schemeClr val="tx1"/>
+                </a:solidFill>
+                <a:latin typeface="+mn-lt"/>
+                <a:ea typeface="+mn-ea"/>
+                <a:cs typeface="+mn-cs"/>
+              </a:defRPr>
+            </a:lvl7pPr>
+            <a:lvl8pPr marL="3429000" indent="-228600" algn="l" defTabSz="914400" rtl="0" eaLnBrk="1" latinLnBrk="0" hangingPunct="1">
+              <a:lnSpc>
+                <a:spcPct val="90000"/>
+              </a:lnSpc>
+              <a:spcBef>
+                <a:spcPts val="500"/>
+              </a:spcBef>
+              <a:buFont typeface="Arial" panose="020B0604020202020204" pitchFamily="34" charset="0"/>
+              <a:buChar char="•"/>
+              <a:defRPr sz="1800" kern="1200">
+                <a:solidFill>
+                  <a:schemeClr val="tx1"/>
+                </a:solidFill>
+                <a:latin typeface="+mn-lt"/>
+                <a:ea typeface="+mn-ea"/>
+                <a:cs typeface="+mn-cs"/>
+              </a:defRPr>
+            </a:lvl8pPr>
+            <a:lvl9pPr marL="3886200" indent="-228600" algn="l" defTabSz="914400" rtl="0" eaLnBrk="1" latinLnBrk="0" hangingPunct="1">
+              <a:lnSpc>
+                <a:spcPct val="90000"/>
+              </a:lnSpc>
+              <a:spcBef>
+                <a:spcPts val="500"/>
+              </a:spcBef>
+              <a:buFont typeface="Arial" panose="020B0604020202020204" pitchFamily="34" charset="0"/>
+              <a:buChar char="•"/>
+              <a:defRPr sz="1800" kern="1200">
+                <a:solidFill>
+                  <a:schemeClr val="tx1"/>
+                </a:solidFill>
+                <a:latin typeface="+mn-lt"/>
+                <a:ea typeface="+mn-ea"/>
+                <a:cs typeface="+mn-cs"/>
+              </a:defRPr>
+            </a:lvl9pPr>
+          </a:lstStyle>
+          <a:p>
+            <a:r>
+              <a:rPr lang="en-US" sz="1800" dirty="0">
+                <a:solidFill>
+                  <a:schemeClr val="bg1">
+                    <a:lumMod val="65000"/>
+                    <a:lumOff val="35000"/>
+                  </a:schemeClr>
+                </a:solidFill>
+                <a:latin typeface="Arial Nova" panose="020F0502020204030204" pitchFamily="34" charset="0"/>
+                <a:cs typeface="Al Nile" pitchFamily="2" charset="-78"/>
+              </a:rPr>
+              <a:t>PROJECTED OUTCOME:  Test Retrieval, Ranking, Sequential models.  </a:t>
+            </a:r>
+          </a:p>
+          <a:p>
+            <a:endParaRPr lang="en-US" sz="1800" dirty="0">
+              <a:solidFill>
+                <a:schemeClr val="bg1">
+                  <a:lumMod val="65000"/>
+                  <a:lumOff val="35000"/>
+                </a:schemeClr>
+              </a:solidFill>
+              <a:latin typeface="Arial Nova" panose="020F0502020204030204" pitchFamily="34" charset="0"/>
+              <a:cs typeface="Al Nile" pitchFamily="2" charset="-78"/>
+            </a:endParaRPr>
+          </a:p>
+          <a:p>
+            <a:pPr algn="ctr"/>
+            <a:endParaRPr lang="en-US" dirty="0">
+              <a:solidFill>
+                <a:schemeClr val="tx1"/>
+              </a:solidFill>
+            </a:endParaRPr>
+          </a:p>
+          <a:p>
+            <a:pPr algn="ctr"/>
+            <a:endParaRPr lang="en-US" dirty="0">
+              <a:solidFill>
+                <a:schemeClr val="tx1"/>
+              </a:solidFill>
+            </a:endParaRPr>
+          </a:p>
+          <a:p>
+            <a:pPr algn="ctr"/>
+            <a:endParaRPr lang="en-US" dirty="0">
+              <a:solidFill>
+                <a:schemeClr val="tx1"/>
+              </a:solidFill>
+            </a:endParaRPr>
+          </a:p>
+          <a:p>
+            <a:pPr algn="ctr"/>
+            <a:endParaRPr lang="en-US" dirty="0">
+              <a:solidFill>
+                <a:schemeClr val="tx1"/>
+              </a:solidFill>
+            </a:endParaRPr>
+          </a:p>
+        </p:txBody>
+      </p:sp>
     </p:spTree>
     <p:extLst>
       <p:ext uri="{BB962C8B-B14F-4D97-AF65-F5344CB8AC3E}">

</xml_diff>